<commit_message>
Add description to results of PowerBI
</commit_message>
<xml_diff>
--- a/Presentation/Presentation.pptx
+++ b/Presentation/Presentation.pptx
@@ -282,7 +282,7 @@
           <a:p>
             <a:fld id="{6D31627D-D357-4AB0-91C9-C30FC458841E}" type="datetimeFigureOut">
               <a:rPr lang="en-US" smtClean="0"/>
-              <a:t>7/28/2023</a:t>
+              <a:t>8/5/2023</a:t>
             </a:fld>
             <a:endParaRPr lang="en-US"/>
           </a:p>
@@ -452,7 +452,7 @@
           <a:p>
             <a:fld id="{6D31627D-D357-4AB0-91C9-C30FC458841E}" type="datetimeFigureOut">
               <a:rPr lang="en-US" smtClean="0"/>
-              <a:t>7/28/2023</a:t>
+              <a:t>8/5/2023</a:t>
             </a:fld>
             <a:endParaRPr lang="en-US"/>
           </a:p>
@@ -632,7 +632,7 @@
           <a:p>
             <a:fld id="{6D31627D-D357-4AB0-91C9-C30FC458841E}" type="datetimeFigureOut">
               <a:rPr lang="en-US" smtClean="0"/>
-              <a:t>7/28/2023</a:t>
+              <a:t>8/5/2023</a:t>
             </a:fld>
             <a:endParaRPr lang="en-US"/>
           </a:p>
@@ -802,7 +802,7 @@
           <a:p>
             <a:fld id="{6D31627D-D357-4AB0-91C9-C30FC458841E}" type="datetimeFigureOut">
               <a:rPr lang="en-US" smtClean="0"/>
-              <a:t>7/28/2023</a:t>
+              <a:t>8/5/2023</a:t>
             </a:fld>
             <a:endParaRPr lang="en-US"/>
           </a:p>
@@ -1048,7 +1048,7 @@
           <a:p>
             <a:fld id="{6D31627D-D357-4AB0-91C9-C30FC458841E}" type="datetimeFigureOut">
               <a:rPr lang="en-US" smtClean="0"/>
-              <a:t>7/28/2023</a:t>
+              <a:t>8/5/2023</a:t>
             </a:fld>
             <a:endParaRPr lang="en-US"/>
           </a:p>
@@ -1280,7 +1280,7 @@
           <a:p>
             <a:fld id="{6D31627D-D357-4AB0-91C9-C30FC458841E}" type="datetimeFigureOut">
               <a:rPr lang="en-US" smtClean="0"/>
-              <a:t>7/28/2023</a:t>
+              <a:t>8/5/2023</a:t>
             </a:fld>
             <a:endParaRPr lang="en-US"/>
           </a:p>
@@ -1647,7 +1647,7 @@
           <a:p>
             <a:fld id="{6D31627D-D357-4AB0-91C9-C30FC458841E}" type="datetimeFigureOut">
               <a:rPr lang="en-US" smtClean="0"/>
-              <a:t>7/28/2023</a:t>
+              <a:t>8/5/2023</a:t>
             </a:fld>
             <a:endParaRPr lang="en-US"/>
           </a:p>
@@ -1765,7 +1765,7 @@
           <a:p>
             <a:fld id="{6D31627D-D357-4AB0-91C9-C30FC458841E}" type="datetimeFigureOut">
               <a:rPr lang="en-US" smtClean="0"/>
-              <a:t>7/28/2023</a:t>
+              <a:t>8/5/2023</a:t>
             </a:fld>
             <a:endParaRPr lang="en-US"/>
           </a:p>
@@ -1860,7 +1860,7 @@
           <a:p>
             <a:fld id="{6D31627D-D357-4AB0-91C9-C30FC458841E}" type="datetimeFigureOut">
               <a:rPr lang="en-US" smtClean="0"/>
-              <a:t>7/28/2023</a:t>
+              <a:t>8/5/2023</a:t>
             </a:fld>
             <a:endParaRPr lang="en-US"/>
           </a:p>
@@ -2137,7 +2137,7 @@
           <a:p>
             <a:fld id="{6D31627D-D357-4AB0-91C9-C30FC458841E}" type="datetimeFigureOut">
               <a:rPr lang="en-US" smtClean="0"/>
-              <a:t>7/28/2023</a:t>
+              <a:t>8/5/2023</a:t>
             </a:fld>
             <a:endParaRPr lang="en-US"/>
           </a:p>
@@ -2390,7 +2390,7 @@
           <a:p>
             <a:fld id="{6D31627D-D357-4AB0-91C9-C30FC458841E}" type="datetimeFigureOut">
               <a:rPr lang="en-US" smtClean="0"/>
-              <a:t>7/28/2023</a:t>
+              <a:t>8/5/2023</a:t>
             </a:fld>
             <a:endParaRPr lang="en-US"/>
           </a:p>
@@ -2603,7 +2603,7 @@
           <a:p>
             <a:fld id="{6D31627D-D357-4AB0-91C9-C30FC458841E}" type="datetimeFigureOut">
               <a:rPr lang="en-US" smtClean="0"/>
-              <a:t>7/28/2023</a:t>
+              <a:t>8/5/2023</a:t>
             </a:fld>
             <a:endParaRPr lang="en-US"/>
           </a:p>
@@ -3025,7 +3025,7 @@
           <a:p>
             <a:r>
               <a:rPr lang="en-US" dirty="0" smtClean="0"/>
-              <a:t>Homework task</a:t>
+              <a:t>Portfolio project</a:t>
             </a:r>
             <a:endParaRPr lang="en-US" dirty="0"/>
           </a:p>
@@ -6458,11 +6458,7 @@
             </a:r>
             <a:r>
               <a:rPr lang="en-US" b="1" dirty="0" smtClean="0"/>
-              <a:t>1 is </a:t>
-            </a:r>
-            <a:r>
-              <a:rPr lang="en-US" b="1" dirty="0" smtClean="0"/>
-              <a:t>Clustered </a:t>
+              <a:t>1 is Clustered </a:t>
             </a:r>
             <a:r>
               <a:rPr lang="en-US" b="1" dirty="0"/>
@@ -6486,11 +6482,7 @@
             </a:r>
             <a:r>
               <a:rPr lang="en-US" b="1" dirty="0" smtClean="0"/>
-              <a:t>2 of them are </a:t>
-            </a:r>
-            <a:r>
-              <a:rPr lang="en-US" b="1" dirty="0" smtClean="0"/>
-              <a:t>Line </a:t>
+              <a:t>2 of them are Line </a:t>
             </a:r>
             <a:r>
               <a:rPr lang="en-US" b="1" dirty="0"/>
@@ -6500,7 +6492,6 @@
               <a:rPr lang="en-US" b="1" dirty="0" smtClean="0"/>
               <a:t>hart</a:t>
             </a:r>
-            <a:endParaRPr lang="en-US" b="1" dirty="0" smtClean="0"/>
           </a:p>
           <a:p>
             <a:pPr algn="just"/>
@@ -6525,15 +6516,7 @@
             <a:pPr algn="just"/>
             <a:r>
               <a:rPr lang="en-US" dirty="0" smtClean="0"/>
-              <a:t>2 Line </a:t>
-            </a:r>
-            <a:r>
-              <a:rPr lang="en-US" dirty="0" smtClean="0"/>
-              <a:t>Charts </a:t>
-            </a:r>
-            <a:r>
-              <a:rPr lang="en-US" dirty="0" smtClean="0"/>
-              <a:t>aim to show claims by registration year and vehicle year separately. These line charts are powered with forecasting. </a:t>
+              <a:t>2 Line Charts aim to show claims by registration year and vehicle year separately. These line charts are powered with forecasting. </a:t>
             </a:r>
             <a:r>
               <a:rPr lang="en-US" b="1" dirty="0" smtClean="0"/>

</xml_diff>